<commit_message>
updated slides with model results
</commit_message>
<xml_diff>
--- a/presentation/project2_draft1.pptx
+++ b/presentation/project2_draft1.pptx
@@ -7,15 +7,16 @@
   <p:sldIdLst>
     <p:sldId id="256" r:id="rId3"/>
     <p:sldId id="266" r:id="rId4"/>
-    <p:sldId id="263" r:id="rId5"/>
-    <p:sldId id="267" r:id="rId6"/>
-    <p:sldId id="262" r:id="rId7"/>
-    <p:sldId id="257" r:id="rId8"/>
-    <p:sldId id="261" r:id="rId9"/>
-    <p:sldId id="269" r:id="rId10"/>
-    <p:sldId id="258" r:id="rId11"/>
-    <p:sldId id="259" r:id="rId12"/>
+    <p:sldId id="276" r:id="rId5"/>
+    <p:sldId id="263" r:id="rId6"/>
+    <p:sldId id="267" r:id="rId7"/>
+    <p:sldId id="262" r:id="rId8"/>
+    <p:sldId id="257" r:id="rId9"/>
+    <p:sldId id="261" r:id="rId10"/>
+    <p:sldId id="269" r:id="rId11"/>
+    <p:sldId id="258" r:id="rId12"/>
     <p:sldId id="260" r:id="rId13"/>
+    <p:sldId id="259" r:id="rId14"/>
   </p:sldIdLst>
   <p:sldSz cx="12192000" cy="6858000"/>
   <p:notesSz cx="6858000" cy="9144000"/>
@@ -2989,6 +2990,359 @@
       <p:grpSpPr/>
       <p:sp>
         <p:nvSpPr>
+          <p:cNvPr id="9" name="Title 8"/>
+          <p:cNvSpPr>
+            <a:spLocks noGrp="1"/>
+          </p:cNvSpPr>
+          <p:nvPr>
+            <p:ph type="title"/>
+          </p:nvPr>
+        </p:nvSpPr>
+        <p:spPr/>
+        <p:txBody>
+          <a:bodyPr>
+            <a:normAutofit fontScale="90000"/>
+          </a:bodyPr>
+          <a:p>
+            <a:r>
+              <a:rPr lang="en-US"/>
+              <a:t>Feature Engineered RNN - </a:t>
+            </a:r>
+            <a:r>
+              <a:rPr lang="en-US" sz="3100"/>
+              <a:t>10 features, </a:t>
+            </a:r>
+            <a:r>
+              <a:rPr lang="en-US" sz="2700">
+                <a:sym typeface="+mn-ea"/>
+              </a:rPr>
+              <a:t>5day Predictions</a:t>
+            </a:r>
+            <a:br>
+              <a:rPr lang="en-US" sz="2700">
+                <a:sym typeface="+mn-ea"/>
+              </a:rPr>
+            </a:br>
+            <a:r>
+              <a:rPr lang="en-US" sz="2700">
+                <a:sym typeface="+mn-ea"/>
+              </a:rPr>
+              <a:t>nnodes = 100, Batch_size=5, epochs=100, dropout=0, train test: 70% validate-10% </a:t>
+            </a:r>
+            <a:endParaRPr lang="en-US"/>
+          </a:p>
+        </p:txBody>
+      </p:sp>
+      <p:pic>
+        <p:nvPicPr>
+          <p:cNvPr id="7" name="Content Placeholder 6" descr="image (7)"/>
+          <p:cNvPicPr>
+            <a:picLocks noChangeAspect="1"/>
+          </p:cNvPicPr>
+          <p:nvPr>
+            <p:ph sz="half" idx="1"/>
+          </p:nvPr>
+        </p:nvPicPr>
+        <p:blipFill>
+          <a:blip r:embed="rId1"/>
+          <a:stretch>
+            <a:fillRect/>
+          </a:stretch>
+        </p:blipFill>
+        <p:spPr>
+          <a:xfrm>
+            <a:off x="6381750" y="5293360"/>
+            <a:ext cx="5181600" cy="1379855"/>
+          </a:xfrm>
+          <a:prstGeom prst="rect">
+            <a:avLst/>
+          </a:prstGeom>
+        </p:spPr>
+      </p:pic>
+      <p:pic>
+        <p:nvPicPr>
+          <p:cNvPr id="8" name="Content Placeholder 7" descr="image (8)"/>
+          <p:cNvPicPr>
+            <a:picLocks noChangeAspect="1"/>
+          </p:cNvPicPr>
+          <p:nvPr>
+            <p:ph sz="half" idx="2"/>
+          </p:nvPr>
+        </p:nvPicPr>
+        <p:blipFill>
+          <a:blip r:embed="rId2"/>
+          <a:stretch>
+            <a:fillRect/>
+          </a:stretch>
+        </p:blipFill>
+        <p:spPr>
+          <a:xfrm>
+            <a:off x="6140450" y="3521710"/>
+            <a:ext cx="5422900" cy="1414780"/>
+          </a:xfrm>
+          <a:prstGeom prst="rect">
+            <a:avLst/>
+          </a:prstGeom>
+        </p:spPr>
+      </p:pic>
+      <p:pic>
+        <p:nvPicPr>
+          <p:cNvPr id="15" name="Picture 14" descr="xg_lstm_100u-50e-100b-10day"/>
+          <p:cNvPicPr>
+            <a:picLocks noChangeAspect="1"/>
+          </p:cNvPicPr>
+          <p:nvPr/>
+        </p:nvPicPr>
+        <p:blipFill>
+          <a:blip r:embed="rId3"/>
+          <a:stretch>
+            <a:fillRect/>
+          </a:stretch>
+        </p:blipFill>
+        <p:spPr>
+          <a:xfrm>
+            <a:off x="175260" y="3262630"/>
+            <a:ext cx="5965190" cy="1547495"/>
+          </a:xfrm>
+          <a:prstGeom prst="rect">
+            <a:avLst/>
+          </a:prstGeom>
+        </p:spPr>
+      </p:pic>
+      <p:pic>
+        <p:nvPicPr>
+          <p:cNvPr id="17" name="Picture 16" descr="xg_lstm_100u-100e-100b-10day"/>
+          <p:cNvPicPr>
+            <a:picLocks noChangeAspect="1"/>
+          </p:cNvPicPr>
+          <p:nvPr/>
+        </p:nvPicPr>
+        <p:blipFill>
+          <a:blip r:embed="rId4"/>
+          <a:stretch>
+            <a:fillRect/>
+          </a:stretch>
+        </p:blipFill>
+        <p:spPr>
+          <a:xfrm>
+            <a:off x="175260" y="5090795"/>
+            <a:ext cx="5549900" cy="1469390"/>
+          </a:xfrm>
+          <a:prstGeom prst="rect">
+            <a:avLst/>
+          </a:prstGeom>
+        </p:spPr>
+      </p:pic>
+      <p:pic>
+        <p:nvPicPr>
+          <p:cNvPr id="18" name="Picture 17" descr="pca_lstm_100u-50e-100b-5day"/>
+          <p:cNvPicPr>
+            <a:picLocks noChangeAspect="1"/>
+          </p:cNvPicPr>
+          <p:nvPr/>
+        </p:nvPicPr>
+        <p:blipFill>
+          <a:blip r:embed="rId5"/>
+          <a:stretch>
+            <a:fillRect/>
+          </a:stretch>
+        </p:blipFill>
+        <p:spPr>
+          <a:xfrm>
+            <a:off x="6189345" y="1691005"/>
+            <a:ext cx="6002655" cy="1571625"/>
+          </a:xfrm>
+          <a:prstGeom prst="rect">
+            <a:avLst/>
+          </a:prstGeom>
+        </p:spPr>
+      </p:pic>
+      <p:pic>
+        <p:nvPicPr>
+          <p:cNvPr id="19" name="Picture 18" descr="xg_lstm_100u-200e-100b-5day"/>
+          <p:cNvPicPr>
+            <a:picLocks noChangeAspect="1"/>
+          </p:cNvPicPr>
+          <p:nvPr/>
+        </p:nvPicPr>
+        <p:blipFill>
+          <a:blip r:embed="rId6"/>
+          <a:stretch>
+            <a:fillRect/>
+          </a:stretch>
+        </p:blipFill>
+        <p:spPr>
+          <a:xfrm>
+            <a:off x="334645" y="1774825"/>
+            <a:ext cx="5854700" cy="1487805"/>
+          </a:xfrm>
+          <a:prstGeom prst="rect">
+            <a:avLst/>
+          </a:prstGeom>
+        </p:spPr>
+      </p:pic>
+    </p:spTree>
+  </p:cSld>
+  <p:clrMapOvr>
+    <a:masterClrMapping/>
+  </p:clrMapOvr>
+</p:sld>
+</file>
+
+<file path=ppt/slides/slide11.xml><?xml version="1.0" encoding="utf-8"?>
+<p:sld xmlns:a="http://schemas.openxmlformats.org/drawingml/2006/main" xmlns:r="http://schemas.openxmlformats.org/officeDocument/2006/relationships" xmlns:p="http://schemas.openxmlformats.org/presentationml/2006/main">
+  <p:cSld>
+    <p:spTree>
+      <p:nvGrpSpPr>
+        <p:cNvPr id="1" name=""/>
+        <p:cNvGrpSpPr/>
+        <p:nvPr/>
+      </p:nvGrpSpPr>
+      <p:grpSpPr/>
+      <p:sp>
+        <p:nvSpPr>
+          <p:cNvPr id="7" name="Title 6"/>
+          <p:cNvSpPr>
+            <a:spLocks noGrp="1"/>
+          </p:cNvSpPr>
+          <p:nvPr>
+            <p:ph type="title"/>
+          </p:nvPr>
+        </p:nvSpPr>
+        <p:spPr/>
+        <p:txBody>
+          <a:bodyPr>
+            <a:normAutofit fontScale="90000"/>
+          </a:bodyPr>
+          <a:p>
+            <a:r>
+              <a:rPr lang="en-US"/>
+              <a:t>Dimensional reduction using PCA - RNN predictions</a:t>
+            </a:r>
+            <a:endParaRPr lang="en-US"/>
+          </a:p>
+        </p:txBody>
+      </p:sp>
+      <p:pic>
+        <p:nvPicPr>
+          <p:cNvPr id="16" name="Content Placeholder 15" descr="mv-lstm-25-10e-10u"/>
+          <p:cNvPicPr>
+            <a:picLocks noChangeAspect="1"/>
+          </p:cNvPicPr>
+          <p:nvPr>
+            <p:ph sz="half" idx="1"/>
+          </p:nvPr>
+        </p:nvPicPr>
+        <p:blipFill>
+          <a:blip r:embed="rId1"/>
+          <a:stretch>
+            <a:fillRect/>
+          </a:stretch>
+        </p:blipFill>
+        <p:spPr>
+          <a:xfrm>
+            <a:off x="738505" y="1811020"/>
+            <a:ext cx="5181600" cy="2388235"/>
+          </a:xfrm>
+          <a:prstGeom prst="rect">
+            <a:avLst/>
+          </a:prstGeom>
+        </p:spPr>
+      </p:pic>
+      <p:pic>
+        <p:nvPicPr>
+          <p:cNvPr id="14" name="Content Placeholder 13" descr="mvlstm_final-50-50-10"/>
+          <p:cNvPicPr>
+            <a:picLocks noChangeAspect="1"/>
+          </p:cNvPicPr>
+          <p:nvPr>
+            <p:ph sz="half" idx="2"/>
+          </p:nvPr>
+        </p:nvPicPr>
+        <p:blipFill>
+          <a:blip r:embed="rId2"/>
+          <a:stretch>
+            <a:fillRect/>
+          </a:stretch>
+        </p:blipFill>
+        <p:spPr>
+          <a:xfrm>
+            <a:off x="6172200" y="1811020"/>
+            <a:ext cx="5181600" cy="2430780"/>
+          </a:xfrm>
+          <a:prstGeom prst="rect">
+            <a:avLst/>
+          </a:prstGeom>
+        </p:spPr>
+      </p:pic>
+      <p:pic>
+        <p:nvPicPr>
+          <p:cNvPr id="13" name="Picture 12" descr="sv_lstm-200u-200e-5"/>
+          <p:cNvPicPr>
+            <a:picLocks noChangeAspect="1"/>
+          </p:cNvPicPr>
+          <p:nvPr/>
+        </p:nvPicPr>
+        <p:blipFill>
+          <a:blip r:embed="rId3"/>
+          <a:stretch>
+            <a:fillRect/>
+          </a:stretch>
+        </p:blipFill>
+        <p:spPr>
+          <a:xfrm>
+            <a:off x="639445" y="4039235"/>
+            <a:ext cx="5380355" cy="2576195"/>
+          </a:xfrm>
+          <a:prstGeom prst="rect">
+            <a:avLst/>
+          </a:prstGeom>
+        </p:spPr>
+      </p:pic>
+      <p:pic>
+        <p:nvPicPr>
+          <p:cNvPr id="12" name="Picture 11" descr="mv_lstm_100U-100-b100e-5day"/>
+          <p:cNvPicPr>
+            <a:picLocks noChangeAspect="1"/>
+          </p:cNvPicPr>
+          <p:nvPr/>
+        </p:nvPicPr>
+        <p:blipFill>
+          <a:blip r:embed="rId4"/>
+          <a:stretch>
+            <a:fillRect/>
+          </a:stretch>
+        </p:blipFill>
+        <p:spPr>
+          <a:xfrm>
+            <a:off x="6172200" y="4199255"/>
+            <a:ext cx="5414645" cy="2560955"/>
+          </a:xfrm>
+          <a:prstGeom prst="rect">
+            <a:avLst/>
+          </a:prstGeom>
+        </p:spPr>
+      </p:pic>
+    </p:spTree>
+  </p:cSld>
+  <p:clrMapOvr>
+    <a:masterClrMapping/>
+  </p:clrMapOvr>
+</p:sld>
+</file>
+
+<file path=ppt/slides/slide12.xml><?xml version="1.0" encoding="utf-8"?>
+<p:sld xmlns:a="http://schemas.openxmlformats.org/drawingml/2006/main" xmlns:r="http://schemas.openxmlformats.org/officeDocument/2006/relationships" xmlns:p="http://schemas.openxmlformats.org/presentationml/2006/main">
+  <p:cSld>
+    <p:spTree>
+      <p:nvGrpSpPr>
+        <p:cNvPr id="1" name=""/>
+        <p:cNvGrpSpPr/>
+        <p:nvPr/>
+      </p:nvGrpSpPr>
+      <p:grpSpPr/>
+      <p:sp>
+        <p:nvSpPr>
           <p:cNvPr id="5" name="Title 4"/>
           <p:cNvSpPr>
             <a:spLocks noGrp="1"/>
@@ -3278,148 +3632,6 @@
 </p:sld>
 </file>
 
-<file path=ppt/slides/slide11.xml><?xml version="1.0" encoding="utf-8"?>
-<p:sld xmlns:a="http://schemas.openxmlformats.org/drawingml/2006/main" xmlns:r="http://schemas.openxmlformats.org/officeDocument/2006/relationships" xmlns:p="http://schemas.openxmlformats.org/presentationml/2006/main">
-  <p:cSld>
-    <p:spTree>
-      <p:nvGrpSpPr>
-        <p:cNvPr id="1" name=""/>
-        <p:cNvGrpSpPr/>
-        <p:nvPr/>
-      </p:nvGrpSpPr>
-      <p:grpSpPr/>
-      <p:sp>
-        <p:nvSpPr>
-          <p:cNvPr id="7" name="Title 6"/>
-          <p:cNvSpPr>
-            <a:spLocks noGrp="1"/>
-          </p:cNvSpPr>
-          <p:nvPr>
-            <p:ph type="title"/>
-          </p:nvPr>
-        </p:nvSpPr>
-        <p:spPr/>
-        <p:txBody>
-          <a:bodyPr>
-            <a:normAutofit/>
-          </a:bodyPr>
-          <a:p>
-            <a:r>
-              <a:rPr lang="en-US"/>
-              <a:t>supporting plots for slide#7</a:t>
-            </a:r>
-            <a:endParaRPr lang="en-US"/>
-          </a:p>
-        </p:txBody>
-      </p:sp>
-      <p:pic>
-        <p:nvPicPr>
-          <p:cNvPr id="16" name="Content Placeholder 15" descr="mv-lstm-25-10e-10u"/>
-          <p:cNvPicPr>
-            <a:picLocks noChangeAspect="1"/>
-          </p:cNvPicPr>
-          <p:nvPr>
-            <p:ph sz="half" idx="1"/>
-          </p:nvPr>
-        </p:nvPicPr>
-        <p:blipFill>
-          <a:blip r:embed="rId1"/>
-          <a:stretch>
-            <a:fillRect/>
-          </a:stretch>
-        </p:blipFill>
-        <p:spPr>
-          <a:xfrm>
-            <a:off x="738505" y="1811020"/>
-            <a:ext cx="5181600" cy="2388235"/>
-          </a:xfrm>
-          <a:prstGeom prst="rect">
-            <a:avLst/>
-          </a:prstGeom>
-        </p:spPr>
-      </p:pic>
-      <p:pic>
-        <p:nvPicPr>
-          <p:cNvPr id="14" name="Content Placeholder 13" descr="mvlstm_final-50-50-10"/>
-          <p:cNvPicPr>
-            <a:picLocks noChangeAspect="1"/>
-          </p:cNvPicPr>
-          <p:nvPr>
-            <p:ph sz="half" idx="2"/>
-          </p:nvPr>
-        </p:nvPicPr>
-        <p:blipFill>
-          <a:blip r:embed="rId2"/>
-          <a:stretch>
-            <a:fillRect/>
-          </a:stretch>
-        </p:blipFill>
-        <p:spPr>
-          <a:xfrm>
-            <a:off x="6172200" y="1811020"/>
-            <a:ext cx="5181600" cy="2430780"/>
-          </a:xfrm>
-          <a:prstGeom prst="rect">
-            <a:avLst/>
-          </a:prstGeom>
-        </p:spPr>
-      </p:pic>
-      <p:pic>
-        <p:nvPicPr>
-          <p:cNvPr id="13" name="Picture 12" descr="sv_lstm-200u-200e-5"/>
-          <p:cNvPicPr>
-            <a:picLocks noChangeAspect="1"/>
-          </p:cNvPicPr>
-          <p:nvPr/>
-        </p:nvPicPr>
-        <p:blipFill>
-          <a:blip r:embed="rId3"/>
-          <a:stretch>
-            <a:fillRect/>
-          </a:stretch>
-        </p:blipFill>
-        <p:spPr>
-          <a:xfrm>
-            <a:off x="639445" y="4039235"/>
-            <a:ext cx="5380355" cy="2576195"/>
-          </a:xfrm>
-          <a:prstGeom prst="rect">
-            <a:avLst/>
-          </a:prstGeom>
-        </p:spPr>
-      </p:pic>
-      <p:pic>
-        <p:nvPicPr>
-          <p:cNvPr id="12" name="Picture 11" descr="mv_lstm_100U-100-b100e-5day"/>
-          <p:cNvPicPr>
-            <a:picLocks noChangeAspect="1"/>
-          </p:cNvPicPr>
-          <p:nvPr/>
-        </p:nvPicPr>
-        <p:blipFill>
-          <a:blip r:embed="rId4"/>
-          <a:stretch>
-            <a:fillRect/>
-          </a:stretch>
-        </p:blipFill>
-        <p:spPr>
-          <a:xfrm>
-            <a:off x="6172200" y="4199255"/>
-            <a:ext cx="5414645" cy="2560955"/>
-          </a:xfrm>
-          <a:prstGeom prst="rect">
-            <a:avLst/>
-          </a:prstGeom>
-        </p:spPr>
-      </p:pic>
-    </p:spTree>
-  </p:cSld>
-  <p:clrMapOvr>
-    <a:masterClrMapping/>
-  </p:clrMapOvr>
-</p:sld>
-</file>
-
 <file path=ppt/slides/slide2.xml><?xml version="1.0" encoding="utf-8"?>
 <p:sld xmlns:a="http://schemas.openxmlformats.org/drawingml/2006/main" xmlns:r="http://schemas.openxmlformats.org/officeDocument/2006/relationships" xmlns:p="http://schemas.openxmlformats.org/presentationml/2006/main">
   <p:cSld>
@@ -3536,7 +3748,7 @@
       <p:grpSpPr/>
       <p:sp>
         <p:nvSpPr>
-          <p:cNvPr id="9" name="Title 8"/>
+          <p:cNvPr id="2" name="Title 1"/>
           <p:cNvSpPr>
             <a:spLocks noGrp="1"/>
           </p:cNvSpPr>
@@ -3550,345 +3762,98 @@
           <a:p>
             <a:r>
               <a:rPr lang="en-US"/>
-              <a:t>Univariate Time Series Model Predictions</a:t>
-            </a:r>
-            <a:endParaRPr lang="en-US"/>
-          </a:p>
-        </p:txBody>
-      </p:sp>
-      <p:pic>
-        <p:nvPicPr>
-          <p:cNvPr id="16" name="Picture 15" descr="arma"/>
-          <p:cNvPicPr>
-            <a:picLocks noChangeAspect="1"/>
-          </p:cNvPicPr>
-          <p:nvPr/>
-        </p:nvPicPr>
-        <p:blipFill>
-          <a:blip r:embed="rId1"/>
-          <a:stretch>
-            <a:fillRect/>
-          </a:stretch>
-        </p:blipFill>
-        <p:spPr>
-          <a:xfrm>
-            <a:off x="-120015" y="1744980"/>
-            <a:ext cx="4286885" cy="2281555"/>
-          </a:xfrm>
-          <a:prstGeom prst="rect">
-            <a:avLst/>
-          </a:prstGeom>
-        </p:spPr>
-      </p:pic>
-      <p:pic>
-        <p:nvPicPr>
-          <p:cNvPr id="15" name="Picture 14" descr="arma_pred"/>
-          <p:cNvPicPr>
-            <a:picLocks noChangeAspect="1"/>
-          </p:cNvPicPr>
-          <p:nvPr/>
-        </p:nvPicPr>
-        <p:blipFill>
-          <a:blip r:embed="rId2"/>
-          <a:stretch>
-            <a:fillRect/>
-          </a:stretch>
-        </p:blipFill>
-        <p:spPr>
-          <a:xfrm>
-            <a:off x="120015" y="4121785"/>
-            <a:ext cx="3956050" cy="2299970"/>
-          </a:xfrm>
-          <a:prstGeom prst="rect">
-            <a:avLst/>
-          </a:prstGeom>
-        </p:spPr>
-      </p:pic>
-      <p:pic>
-        <p:nvPicPr>
-          <p:cNvPr id="14" name="Picture 13" descr="arima"/>
-          <p:cNvPicPr>
-            <a:picLocks noChangeAspect="1"/>
-          </p:cNvPicPr>
-          <p:nvPr/>
-        </p:nvPicPr>
-        <p:blipFill>
-          <a:blip r:embed="rId3"/>
-          <a:stretch>
-            <a:fillRect/>
-          </a:stretch>
-        </p:blipFill>
-        <p:spPr>
-          <a:xfrm>
-            <a:off x="4104005" y="1689735"/>
-            <a:ext cx="4040505" cy="2209165"/>
-          </a:xfrm>
-          <a:prstGeom prst="rect">
-            <a:avLst/>
-          </a:prstGeom>
-        </p:spPr>
-      </p:pic>
-      <p:pic>
-        <p:nvPicPr>
-          <p:cNvPr id="13" name="Picture 12" descr="arima_pred"/>
-          <p:cNvPicPr>
-            <a:picLocks noChangeAspect="1"/>
-          </p:cNvPicPr>
-          <p:nvPr/>
-        </p:nvPicPr>
-        <p:blipFill>
-          <a:blip r:embed="rId4"/>
-          <a:stretch>
-            <a:fillRect/>
-          </a:stretch>
-        </p:blipFill>
-        <p:spPr>
-          <a:xfrm>
-            <a:off x="4211320" y="4026535"/>
-            <a:ext cx="3768725" cy="2395220"/>
-          </a:xfrm>
-          <a:prstGeom prst="rect">
-            <a:avLst/>
-          </a:prstGeom>
-        </p:spPr>
-      </p:pic>
-      <p:pic>
-        <p:nvPicPr>
-          <p:cNvPr id="11" name="Content Placeholder 10" descr="garch_pred"/>
-          <p:cNvPicPr>
-            <a:picLocks noChangeAspect="1"/>
-          </p:cNvPicPr>
+              <a:t>Data Preparation</a:t>
+            </a:r>
+            <a:endParaRPr lang="en-US"/>
+          </a:p>
+        </p:txBody>
+      </p:sp>
+      <p:sp>
+        <p:nvSpPr>
+          <p:cNvPr id="3" name="Content Placeholder 2"/>
+          <p:cNvSpPr>
+            <a:spLocks noGrp="1"/>
+          </p:cNvSpPr>
           <p:nvPr>
             <p:ph idx="1"/>
           </p:nvPr>
-        </p:nvPicPr>
-        <p:blipFill>
-          <a:blip r:embed="rId5"/>
-          <a:stretch>
-            <a:fillRect/>
-          </a:stretch>
-        </p:blipFill>
-        <p:spPr>
-          <a:xfrm>
-            <a:off x="7980045" y="3943350"/>
-            <a:ext cx="4001770" cy="2657475"/>
-          </a:xfrm>
-          <a:prstGeom prst="rect">
-            <a:avLst/>
-          </a:prstGeom>
-        </p:spPr>
-      </p:pic>
-      <p:pic>
-        <p:nvPicPr>
-          <p:cNvPr id="12" name="Picture 11" descr="garch"/>
-          <p:cNvPicPr>
-            <a:picLocks noChangeAspect="1"/>
-          </p:cNvPicPr>
-          <p:nvPr/>
-        </p:nvPicPr>
-        <p:blipFill>
-          <a:blip r:embed="rId6"/>
-          <a:stretch>
-            <a:fillRect/>
-          </a:stretch>
-        </p:blipFill>
-        <p:spPr>
-          <a:xfrm>
-            <a:off x="8065135" y="1691005"/>
-            <a:ext cx="4098290" cy="2207895"/>
-          </a:xfrm>
-          <a:prstGeom prst="rect">
-            <a:avLst/>
-          </a:prstGeom>
-        </p:spPr>
-      </p:pic>
-      <p:sp>
-        <p:nvSpPr>
-          <p:cNvPr id="19" name="Text Box 18"/>
-          <p:cNvSpPr txBox="1"/>
-          <p:nvPr/>
-        </p:nvSpPr>
-        <p:spPr>
-          <a:xfrm>
-            <a:off x="4337050" y="1351915"/>
-            <a:ext cx="3807460" cy="368300"/>
-          </a:xfrm>
-          <a:prstGeom prst="rect">
-            <a:avLst/>
-          </a:prstGeom>
-          <a:noFill/>
-          <a:ln w="12700" cmpd="sng">
-            <a:solidFill>
-              <a:schemeClr val="accent1">
-                <a:shade val="50000"/>
-              </a:schemeClr>
-            </a:solidFill>
-            <a:prstDash val="solid"/>
-          </a:ln>
-        </p:spPr>
-        <p:txBody>
-          <a:bodyPr wrap="square" rtlCol="0" anchor="t">
-            <a:spAutoFit/>
+        </p:nvSpPr>
+        <p:spPr/>
+        <p:txBody>
+          <a:bodyPr>
+            <a:noAutofit/>
           </a:bodyPr>
           <a:p>
             <a:r>
-              <a:rPr lang="en-US"/>
-              <a:t>MSE: 0.0;  RMSE: 0.0053: MAE:  0.0137</a:t>
-            </a:r>
-            <a:endParaRPr lang="en-US"/>
-          </a:p>
-        </p:txBody>
-      </p:sp>
-      <p:sp>
-        <p:nvSpPr>
-          <p:cNvPr id="21" name="Text Box 20"/>
-          <p:cNvSpPr txBox="1"/>
-          <p:nvPr/>
-        </p:nvSpPr>
-        <p:spPr>
-          <a:xfrm>
-            <a:off x="193040" y="1351915"/>
-            <a:ext cx="4286250" cy="368300"/>
-          </a:xfrm>
-          <a:prstGeom prst="rect">
-            <a:avLst/>
-          </a:prstGeom>
-          <a:noFill/>
-        </p:spPr>
-        <p:txBody>
-          <a:bodyPr wrap="square" rtlCol="0" anchor="t">
-            <a:spAutoFit/>
-          </a:bodyPr>
-          <a:p>
-            <a:r>
-              <a:rPr lang="en-US"/>
-              <a:t>MSE: 0.0;  RMSE: 0.0054: MAE:  0.0137</a:t>
-            </a:r>
-            <a:endParaRPr lang="en-US"/>
-          </a:p>
-        </p:txBody>
-      </p:sp>
-      <p:sp>
-        <p:nvSpPr>
-          <p:cNvPr id="22" name="Text Box 21"/>
-          <p:cNvSpPr txBox="1"/>
-          <p:nvPr/>
-        </p:nvSpPr>
-        <p:spPr>
-          <a:xfrm>
-            <a:off x="120015" y="6460490"/>
-            <a:ext cx="4697730" cy="368300"/>
-          </a:xfrm>
-          <a:prstGeom prst="rect">
-            <a:avLst/>
-          </a:prstGeom>
-          <a:noFill/>
-          <a:ln w="12700" cmpd="sng">
-            <a:solidFill>
-              <a:schemeClr val="accent1">
-                <a:shade val="50000"/>
-              </a:schemeClr>
-            </a:solidFill>
-            <a:prstDash val="solid"/>
-          </a:ln>
-        </p:spPr>
-        <p:txBody>
-          <a:bodyPr wrap="square" rtlCol="0" anchor="t">
-            <a:spAutoFit/>
-          </a:bodyPr>
-          <a:p>
-            <a:r>
-              <a:rPr lang="en-US"/>
-              <a:t>MSE: 0.0001;  RMSE: 0.0072: MAE:  0.0128</a:t>
-            </a:r>
-            <a:endParaRPr lang="en-US"/>
-          </a:p>
-        </p:txBody>
-      </p:sp>
-      <p:sp>
-        <p:nvSpPr>
-          <p:cNvPr id="23" name="Text Box 22"/>
-          <p:cNvSpPr txBox="1"/>
-          <p:nvPr/>
-        </p:nvSpPr>
-        <p:spPr>
-          <a:xfrm>
-            <a:off x="4406265" y="6468110"/>
-            <a:ext cx="3808095" cy="368300"/>
-          </a:xfrm>
-          <a:prstGeom prst="rect">
-            <a:avLst/>
-          </a:prstGeom>
-          <a:noFill/>
-        </p:spPr>
-        <p:txBody>
-          <a:bodyPr wrap="square" rtlCol="0" anchor="t">
-            <a:spAutoFit/>
-          </a:bodyPr>
-          <a:p>
-            <a:r>
-              <a:rPr lang="en-US"/>
-              <a:t>MSE: 0.0;  RMSE: 0.0058: MAE:  0.0114</a:t>
-            </a:r>
-            <a:endParaRPr lang="en-US"/>
-          </a:p>
-        </p:txBody>
-      </p:sp>
-      <p:sp>
-        <p:nvSpPr>
-          <p:cNvPr id="24" name="Text Box 23"/>
-          <p:cNvSpPr txBox="1"/>
-          <p:nvPr/>
-        </p:nvSpPr>
-        <p:spPr>
-          <a:xfrm>
-            <a:off x="8241030" y="1376680"/>
-            <a:ext cx="4509770" cy="368300"/>
-          </a:xfrm>
-          <a:prstGeom prst="rect">
-            <a:avLst/>
-          </a:prstGeom>
-          <a:noFill/>
-        </p:spPr>
-        <p:txBody>
-          <a:bodyPr wrap="square" rtlCol="0" anchor="t">
-            <a:spAutoFit/>
-          </a:bodyPr>
-          <a:p>
-            <a:r>
-              <a:rPr lang="en-US"/>
-              <a:t>MSE: 0.0001;  RMSE: 0.0082: MAE: 0.0136</a:t>
-            </a:r>
-            <a:endParaRPr lang="en-US"/>
-          </a:p>
-        </p:txBody>
-      </p:sp>
-      <p:sp>
-        <p:nvSpPr>
-          <p:cNvPr id="25" name="Text Box 24"/>
-          <p:cNvSpPr txBox="1"/>
-          <p:nvPr/>
-        </p:nvSpPr>
-        <p:spPr>
-          <a:xfrm>
-            <a:off x="8269605" y="6494780"/>
-            <a:ext cx="3922395" cy="368300"/>
-          </a:xfrm>
-          <a:prstGeom prst="rect">
-            <a:avLst/>
-          </a:prstGeom>
-          <a:noFill/>
-        </p:spPr>
-        <p:txBody>
-          <a:bodyPr wrap="square" rtlCol="0" anchor="t">
-            <a:spAutoFit/>
-          </a:bodyPr>
-          <a:p>
-            <a:r>
-              <a:rPr lang="en-US"/>
-              <a:t>MSE: 0.0;  RMSE: 0.0054: MAE:  0.0114</a:t>
-            </a:r>
-            <a:endParaRPr lang="en-US"/>
+              <a:rPr lang="en-US" sz="1800"/>
+              <a:t>1. Data Cleansing:</a:t>
+            </a:r>
+            <a:endParaRPr lang="en-US" sz="1800"/>
+          </a:p>
+          <a:p>
+            <a:pPr lvl="1"/>
+            <a:r>
+              <a:rPr lang="en-US" sz="1800"/>
+              <a:t>Data sourced from the publishers like ALPACA and Fred.Stlouisfed is ready to be used without having to check for dataquality aspects. </a:t>
+            </a:r>
+            <a:endParaRPr lang="en-US" sz="1800"/>
+          </a:p>
+          <a:p>
+            <a:r>
+              <a:rPr lang="en-US" sz="1800"/>
+              <a:t>2. Data pre-processing:</a:t>
+            </a:r>
+            <a:endParaRPr lang="en-US" sz="1800"/>
+          </a:p>
+          <a:p>
+            <a:pPr lvl="1"/>
+            <a:r>
+              <a:rPr lang="en-US" sz="1800"/>
+              <a:t>For Univariate models use the Vix Dataset </a:t>
+            </a:r>
+            <a:endParaRPr lang="en-US" sz="1800"/>
+          </a:p>
+          <a:p>
+            <a:pPr lvl="1"/>
+            <a:r>
+              <a:rPr lang="en-US" sz="1800"/>
+              <a:t>For multivariate forecasting models use previous closing prices to caluculate the Realized Volatility to predict Implied Volatility.</a:t>
+            </a:r>
+            <a:endParaRPr lang="en-US" sz="1800"/>
+          </a:p>
+          <a:p>
+            <a:pPr lvl="1"/>
+            <a:r>
+              <a:rPr lang="en-US" sz="1800"/>
+              <a:t>Use  70% of the data for training and 30% of the data for testing in each model</a:t>
+            </a:r>
+            <a:endParaRPr lang="en-US" sz="1800"/>
+          </a:p>
+          <a:p>
+            <a:pPr lvl="1"/>
+            <a:r>
+              <a:rPr lang="en-US" sz="1800">
+                <a:sym typeface="+mn-ea"/>
+              </a:rPr>
+              <a:t>Slice the data and time box it for the n day window.</a:t>
+            </a:r>
+            <a:endParaRPr lang="en-US" sz="1800"/>
+          </a:p>
+          <a:p>
+            <a:pPr lvl="1"/>
+            <a:r>
+              <a:rPr lang="en-US" sz="1800"/>
+              <a:t>using MinMaxScaler scale X and y values for the model. for Multivariate &amp; multi dimensional data set, create matrix of MinMaxScalers to suppoort Vectors of more than 2 dimensions. </a:t>
+            </a:r>
+            <a:endParaRPr lang="en-US" sz="1800"/>
+          </a:p>
+          <a:p>
+            <a:pPr lvl="1"/>
+            <a:r>
+              <a:rPr lang="en-US" sz="1800"/>
+              <a:t>In case of multistep forecasting, the dimensions of our samples will be more than 2 dimensions. for building the LSTM models, the input shape has to be in the form of (n_samples, n_features and n_steps) which is a 3 dimensional vector. using Reshape method, x_train &amp; x_test data sets are converted into the input shape for the LSTM models.</a:t>
+            </a:r>
+            <a:endParaRPr lang="en-US" sz="1800"/>
           </a:p>
         </p:txBody>
       </p:sp>
@@ -3912,7 +3877,7 @@
       <p:grpSpPr/>
       <p:sp>
         <p:nvSpPr>
-          <p:cNvPr id="8" name="Title 7"/>
+          <p:cNvPr id="9" name="Title 8"/>
           <p:cNvSpPr>
             <a:spLocks noGrp="1"/>
           </p:cNvSpPr>
@@ -3920,20 +3885,13 @@
             <p:ph type="title"/>
           </p:nvPr>
         </p:nvSpPr>
-        <p:spPr>
-          <a:xfrm>
-            <a:off x="596900" y="365125"/>
-            <a:ext cx="11088370" cy="1325880"/>
-          </a:xfrm>
-        </p:spPr>
-        <p:txBody>
-          <a:bodyPr>
-            <a:normAutofit fontScale="90000"/>
-          </a:bodyPr>
+        <p:spPr/>
+        <p:txBody>
+          <a:bodyPr/>
           <a:p>
             <a:r>
               <a:rPr lang="en-US"/>
-              <a:t>Can TS Stat Models accurately predict multi-step forecast?</a:t>
+              <a:t>Univariate Time Series Model Predictions</a:t>
             </a:r>
             <a:endParaRPr lang="en-US"/>
           </a:p>
@@ -3941,13 +3899,11 @@
       </p:sp>
       <p:pic>
         <p:nvPicPr>
-          <p:cNvPr id="7" name="Content Placeholder 6"/>
+          <p:cNvPr id="16" name="Picture 15" descr="arma"/>
           <p:cNvPicPr>
             <a:picLocks noChangeAspect="1"/>
           </p:cNvPicPr>
-          <p:nvPr>
-            <p:ph sz="half" idx="1"/>
-          </p:nvPr>
+          <p:nvPr/>
         </p:nvPicPr>
         <p:blipFill>
           <a:blip r:embed="rId1"/>
@@ -3957,8 +3913,8 @@
         </p:blipFill>
         <p:spPr>
           <a:xfrm>
-            <a:off x="1048385" y="3260090"/>
-            <a:ext cx="10545445" cy="1828165"/>
+            <a:off x="-120015" y="1744980"/>
+            <a:ext cx="4286885" cy="2281555"/>
           </a:xfrm>
           <a:prstGeom prst="rect">
             <a:avLst/>
@@ -3967,13 +3923,11 @@
       </p:pic>
       <p:pic>
         <p:nvPicPr>
-          <p:cNvPr id="9" name="Content Placeholder 8"/>
+          <p:cNvPr id="15" name="Picture 14" descr="arma_pred"/>
           <p:cNvPicPr>
             <a:picLocks noChangeAspect="1"/>
           </p:cNvPicPr>
-          <p:nvPr>
-            <p:ph sz="half" idx="2"/>
-          </p:nvPr>
+          <p:nvPr/>
         </p:nvPicPr>
         <p:blipFill>
           <a:blip r:embed="rId2"/>
@@ -3983,24 +3937,122 @@
         </p:blipFill>
         <p:spPr>
           <a:xfrm>
-            <a:off x="1561465" y="2030730"/>
-            <a:ext cx="10032365" cy="649605"/>
+            <a:off x="120015" y="4121785"/>
+            <a:ext cx="3956050" cy="2299970"/>
           </a:xfrm>
           <a:prstGeom prst="rect">
             <a:avLst/>
           </a:prstGeom>
         </p:spPr>
       </p:pic>
-      <p:sp>
-        <p:nvSpPr>
-          <p:cNvPr id="21" name="Text Box 20"/>
+      <p:pic>
+        <p:nvPicPr>
+          <p:cNvPr id="14" name="Picture 13" descr="arima"/>
+          <p:cNvPicPr>
+            <a:picLocks noChangeAspect="1"/>
+          </p:cNvPicPr>
+          <p:nvPr/>
+        </p:nvPicPr>
+        <p:blipFill>
+          <a:blip r:embed="rId3"/>
+          <a:stretch>
+            <a:fillRect/>
+          </a:stretch>
+        </p:blipFill>
+        <p:spPr>
+          <a:xfrm>
+            <a:off x="4104005" y="1689735"/>
+            <a:ext cx="4040505" cy="2209165"/>
+          </a:xfrm>
+          <a:prstGeom prst="rect">
+            <a:avLst/>
+          </a:prstGeom>
+        </p:spPr>
+      </p:pic>
+      <p:pic>
+        <p:nvPicPr>
+          <p:cNvPr id="13" name="Picture 12" descr="arima_pred"/>
+          <p:cNvPicPr>
+            <a:picLocks noChangeAspect="1"/>
+          </p:cNvPicPr>
+          <p:nvPr/>
+        </p:nvPicPr>
+        <p:blipFill>
+          <a:blip r:embed="rId4"/>
+          <a:stretch>
+            <a:fillRect/>
+          </a:stretch>
+        </p:blipFill>
+        <p:spPr>
+          <a:xfrm>
+            <a:off x="4211320" y="4026535"/>
+            <a:ext cx="3768725" cy="2395220"/>
+          </a:xfrm>
+          <a:prstGeom prst="rect">
+            <a:avLst/>
+          </a:prstGeom>
+        </p:spPr>
+      </p:pic>
+      <p:pic>
+        <p:nvPicPr>
+          <p:cNvPr id="11" name="Content Placeholder 10" descr="garch_pred"/>
+          <p:cNvPicPr>
+            <a:picLocks noChangeAspect="1"/>
+          </p:cNvPicPr>
+          <p:nvPr>
+            <p:ph idx="1"/>
+          </p:nvPr>
+        </p:nvPicPr>
+        <p:blipFill>
+          <a:blip r:embed="rId5"/>
+          <a:stretch>
+            <a:fillRect/>
+          </a:stretch>
+        </p:blipFill>
+        <p:spPr>
+          <a:xfrm>
+            <a:off x="7980045" y="3943350"/>
+            <a:ext cx="4001770" cy="2657475"/>
+          </a:xfrm>
+          <a:prstGeom prst="rect">
+            <a:avLst/>
+          </a:prstGeom>
+        </p:spPr>
+      </p:pic>
+      <p:pic>
+        <p:nvPicPr>
+          <p:cNvPr id="12" name="Picture 11" descr="garch"/>
+          <p:cNvPicPr>
+            <a:picLocks noChangeAspect="1"/>
+          </p:cNvPicPr>
+          <p:nvPr/>
+        </p:nvPicPr>
+        <p:blipFill>
+          <a:blip r:embed="rId6"/>
+          <a:stretch>
+            <a:fillRect/>
+          </a:stretch>
+        </p:blipFill>
+        <p:spPr>
+          <a:xfrm>
+            <a:off x="8065135" y="1691005"/>
+            <a:ext cx="4098290" cy="2207895"/>
+          </a:xfrm>
+          <a:prstGeom prst="rect">
+            <a:avLst/>
+          </a:prstGeom>
+        </p:spPr>
+      </p:pic>
+      <p:sp>
+        <p:nvSpPr>
+          <p:cNvPr id="19" name="Text Box 18"/>
           <p:cNvSpPr txBox="1"/>
           <p:nvPr/>
         </p:nvSpPr>
         <p:spPr>
           <a:xfrm>
-            <a:off x="1048385" y="5292725"/>
-            <a:ext cx="9445625" cy="922020"/>
+            <a:off x="4337050" y="1351915"/>
+            <a:ext cx="3807460" cy="368300"/>
           </a:xfrm>
           <a:prstGeom prst="rect">
             <a:avLst/>
@@ -4022,36 +4074,22 @@
           <a:p>
             <a:r>
               <a:rPr lang="en-US"/>
-              <a:t>Observation: </a:t>
-            </a:r>
-            <a:endParaRPr lang="en-US"/>
-          </a:p>
-          <a:p>
-            <a:r>
-              <a:rPr lang="en-US"/>
-              <a:t>TimeSeries Models do predict both direction and scale with reasonably high accuracy. </a:t>
-            </a:r>
-            <a:endParaRPr lang="en-US"/>
-          </a:p>
-          <a:p>
-            <a:r>
-              <a:rPr lang="en-US"/>
-              <a:t>When predicting long look ahead periods, TimeSeries models lose the ground on direction &amp; scale. </a:t>
-            </a:r>
-            <a:endParaRPr lang="en-US"/>
-          </a:p>
-        </p:txBody>
-      </p:sp>
-      <p:sp>
-        <p:nvSpPr>
-          <p:cNvPr id="10" name="Text Box 9"/>
+              <a:t>MSE: 0.0;  RMSE: 0.0053: MAE:  0.0137</a:t>
+            </a:r>
+            <a:endParaRPr lang="en-US"/>
+          </a:p>
+        </p:txBody>
+      </p:sp>
+      <p:sp>
+        <p:nvSpPr>
+          <p:cNvPr id="21" name="Text Box 20"/>
           <p:cNvSpPr txBox="1"/>
           <p:nvPr/>
         </p:nvSpPr>
         <p:spPr>
           <a:xfrm>
-            <a:off x="80010" y="3377565"/>
-            <a:ext cx="968375" cy="1476375"/>
+            <a:off x="193040" y="1351915"/>
+            <a:ext cx="4286250" cy="368300"/>
           </a:xfrm>
           <a:prstGeom prst="rect">
             <a:avLst/>
@@ -4065,63 +4103,35 @@
           <a:p>
             <a:r>
               <a:rPr lang="en-US"/>
-              <a:t>p.day+1</a:t>
-            </a:r>
-            <a:endParaRPr lang="en-US"/>
-          </a:p>
-          <a:p>
-            <a:r>
-              <a:rPr lang="en-US"/>
-              <a:t>p.day+1</a:t>
-            </a:r>
-            <a:endParaRPr lang="en-US"/>
-          </a:p>
-          <a:p>
-            <a:r>
-              <a:rPr lang="en-US">
-                <a:sym typeface="+mn-ea"/>
-              </a:rPr>
-              <a:t>p.day+1</a:t>
-            </a:r>
-            <a:endParaRPr lang="en-US"/>
-          </a:p>
-          <a:p>
-            <a:r>
-              <a:rPr lang="en-US">
-                <a:sym typeface="+mn-ea"/>
-              </a:rPr>
-              <a:t>p.day+1</a:t>
-            </a:r>
-            <a:endParaRPr lang="en-US">
-              <a:sym typeface="+mn-ea"/>
-            </a:endParaRPr>
-          </a:p>
-          <a:p>
-            <a:r>
-              <a:rPr lang="en-US">
-                <a:sym typeface="+mn-ea"/>
-              </a:rPr>
-              <a:t>p.day+1</a:t>
-            </a:r>
-            <a:endParaRPr lang="en-US"/>
-          </a:p>
-        </p:txBody>
-      </p:sp>
-      <p:sp>
-        <p:nvSpPr>
-          <p:cNvPr id="11" name="Text Box 10"/>
+              <a:t>MSE: 0.0;  RMSE: 0.0054: MAE:  0.0137</a:t>
+            </a:r>
+            <a:endParaRPr lang="en-US"/>
+          </a:p>
+        </p:txBody>
+      </p:sp>
+      <p:sp>
+        <p:nvSpPr>
+          <p:cNvPr id="22" name="Text Box 21"/>
           <p:cNvSpPr txBox="1"/>
           <p:nvPr/>
         </p:nvSpPr>
         <p:spPr>
           <a:xfrm>
-            <a:off x="1652270" y="1662430"/>
-            <a:ext cx="10033000" cy="368300"/>
+            <a:off x="120015" y="6460490"/>
+            <a:ext cx="4697730" cy="368300"/>
           </a:xfrm>
           <a:prstGeom prst="rect">
             <a:avLst/>
           </a:prstGeom>
           <a:noFill/>
+          <a:ln w="12700" cmpd="sng">
+            <a:solidFill>
+              <a:schemeClr val="accent1">
+                <a:shade val="50000"/>
+              </a:schemeClr>
+            </a:solidFill>
+            <a:prstDash val="solid"/>
+          </a:ln>
         </p:spPr>
         <p:txBody>
           <a:bodyPr wrap="square" rtlCol="0" anchor="t">
@@ -4130,28 +4140,22 @@
           <a:p>
             <a:r>
               <a:rPr lang="en-US"/>
-              <a:t>	t.day+1  		t.day+1		t</a:t>
-            </a:r>
-            <a:r>
-              <a:rPr lang="en-US">
-                <a:sym typeface="+mn-ea"/>
-              </a:rPr>
-              <a:t>.day+1		t.day+1		t.day+1</a:t>
-            </a:r>
-            <a:endParaRPr lang="en-US"/>
-          </a:p>
-        </p:txBody>
-      </p:sp>
-      <p:sp>
-        <p:nvSpPr>
-          <p:cNvPr id="12" name="Text Box 11"/>
+              <a:t>MSE: 0.0001;  RMSE: 0.0072: MAE:  0.0128</a:t>
+            </a:r>
+            <a:endParaRPr lang="en-US"/>
+          </a:p>
+        </p:txBody>
+      </p:sp>
+      <p:sp>
+        <p:nvSpPr>
+          <p:cNvPr id="23" name="Text Box 22"/>
           <p:cNvSpPr txBox="1"/>
           <p:nvPr/>
         </p:nvSpPr>
         <p:spPr>
           <a:xfrm>
-            <a:off x="1561465" y="1662430"/>
-            <a:ext cx="968375" cy="368300"/>
+            <a:off x="4406265" y="6468110"/>
+            <a:ext cx="3808095" cy="368300"/>
           </a:xfrm>
           <a:prstGeom prst="rect">
             <a:avLst/>
@@ -4165,22 +4169,22 @@
           <a:p>
             <a:r>
               <a:rPr lang="en-US"/>
-              <a:t>y_test</a:t>
-            </a:r>
-            <a:endParaRPr lang="en-US"/>
-          </a:p>
-        </p:txBody>
-      </p:sp>
-      <p:sp>
-        <p:nvSpPr>
-          <p:cNvPr id="13" name="Text Box 12"/>
+              <a:t>MSE: 0.0;  RMSE: 0.0058: MAE:  0.0114</a:t>
+            </a:r>
+            <a:endParaRPr lang="en-US"/>
+          </a:p>
+        </p:txBody>
+      </p:sp>
+      <p:sp>
+        <p:nvSpPr>
+          <p:cNvPr id="24" name="Text Box 23"/>
           <p:cNvSpPr txBox="1"/>
           <p:nvPr/>
         </p:nvSpPr>
         <p:spPr>
           <a:xfrm>
-            <a:off x="1179830" y="2921000"/>
-            <a:ext cx="968375" cy="368300"/>
+            <a:off x="8241030" y="1376680"/>
+            <a:ext cx="4509770" cy="368300"/>
           </a:xfrm>
           <a:prstGeom prst="rect">
             <a:avLst/>
@@ -4194,22 +4198,22 @@
           <a:p>
             <a:r>
               <a:rPr lang="en-US"/>
-              <a:t>y_pred</a:t>
-            </a:r>
-            <a:endParaRPr lang="en-US"/>
-          </a:p>
-        </p:txBody>
-      </p:sp>
-      <p:sp>
-        <p:nvSpPr>
-          <p:cNvPr id="14" name="Text Box 13"/>
+              <a:t>MSE: 0.0001;  RMSE: 0.0082: MAE: 0.0136</a:t>
+            </a:r>
+            <a:endParaRPr lang="en-US"/>
+          </a:p>
+        </p:txBody>
+      </p:sp>
+      <p:sp>
+        <p:nvSpPr>
+          <p:cNvPr id="25" name="Text Box 24"/>
           <p:cNvSpPr txBox="1"/>
           <p:nvPr/>
         </p:nvSpPr>
         <p:spPr>
           <a:xfrm>
-            <a:off x="2275205" y="2872740"/>
-            <a:ext cx="9445625" cy="368300"/>
+            <a:off x="8269605" y="6494780"/>
+            <a:ext cx="3922395" cy="368300"/>
           </a:xfrm>
           <a:prstGeom prst="rect">
             <a:avLst/>
@@ -4223,65 +4227,7 @@
           <a:p>
             <a:r>
               <a:rPr lang="en-US"/>
-              <a:t>f.day+1		f</a:t>
-            </a:r>
-            <a:r>
-              <a:rPr lang="en-US">
-                <a:sym typeface="+mn-ea"/>
-              </a:rPr>
-              <a:t>.day</a:t>
-            </a:r>
-            <a:r>
-              <a:rPr lang="en-US"/>
-              <a:t>+2		</a:t>
-            </a:r>
-            <a:r>
-              <a:rPr lang="en-US">
-                <a:sym typeface="+mn-ea"/>
-              </a:rPr>
-              <a:t>f</a:t>
-            </a:r>
-            <a:r>
-              <a:rPr lang="en-US">
-                <a:sym typeface="+mn-ea"/>
-              </a:rPr>
-              <a:t>.day</a:t>
-            </a:r>
-            <a:r>
-              <a:rPr lang="en-US"/>
-              <a:t>+3		</a:t>
-            </a:r>
-            <a:r>
-              <a:rPr lang="en-US">
-                <a:sym typeface="+mn-ea"/>
-              </a:rPr>
-              <a:t>f</a:t>
-            </a:r>
-            <a:r>
-              <a:rPr lang="en-US">
-                <a:sym typeface="+mn-ea"/>
-              </a:rPr>
-              <a:t>.day</a:t>
-            </a:r>
-            <a:r>
-              <a:rPr lang="en-US"/>
-              <a:t>+4		</a:t>
-            </a:r>
-            <a:r>
-              <a:rPr lang="en-US">
-                <a:sym typeface="+mn-ea"/>
-              </a:rPr>
-              <a:t>f</a:t>
-            </a:r>
-            <a:r>
-              <a:rPr lang="en-US">
-                <a:sym typeface="+mn-ea"/>
-              </a:rPr>
-              <a:t>.day</a:t>
-            </a:r>
-            <a:r>
-              <a:rPr lang="en-US"/>
-              <a:t>+5</a:t>
+              <a:t>MSE: 0.0;  RMSE: 0.0054: MAE:  0.0114</a:t>
             </a:r>
             <a:endParaRPr lang="en-US"/>
           </a:p>
@@ -4296,6 +4242,401 @@
 </file>
 
 <file path=ppt/slides/slide5.xml><?xml version="1.0" encoding="utf-8"?>
+<p:sld xmlns:a="http://schemas.openxmlformats.org/drawingml/2006/main" xmlns:r="http://schemas.openxmlformats.org/officeDocument/2006/relationships" xmlns:p="http://schemas.openxmlformats.org/presentationml/2006/main">
+  <p:cSld>
+    <p:spTree>
+      <p:nvGrpSpPr>
+        <p:cNvPr id="1" name=""/>
+        <p:cNvGrpSpPr/>
+        <p:nvPr/>
+      </p:nvGrpSpPr>
+      <p:grpSpPr/>
+      <p:sp>
+        <p:nvSpPr>
+          <p:cNvPr id="8" name="Title 7"/>
+          <p:cNvSpPr>
+            <a:spLocks noGrp="1"/>
+          </p:cNvSpPr>
+          <p:nvPr>
+            <p:ph type="title"/>
+          </p:nvPr>
+        </p:nvSpPr>
+        <p:spPr>
+          <a:xfrm>
+            <a:off x="596900" y="365125"/>
+            <a:ext cx="11088370" cy="1325880"/>
+          </a:xfrm>
+        </p:spPr>
+        <p:txBody>
+          <a:bodyPr>
+            <a:normAutofit fontScale="90000"/>
+          </a:bodyPr>
+          <a:p>
+            <a:r>
+              <a:rPr lang="en-US"/>
+              <a:t>Can TS Stat Models accurately predict multi-step forecast?</a:t>
+            </a:r>
+            <a:endParaRPr lang="en-US"/>
+          </a:p>
+        </p:txBody>
+      </p:sp>
+      <p:pic>
+        <p:nvPicPr>
+          <p:cNvPr id="7" name="Content Placeholder 6"/>
+          <p:cNvPicPr>
+            <a:picLocks noChangeAspect="1"/>
+          </p:cNvPicPr>
+          <p:nvPr>
+            <p:ph sz="half" idx="1"/>
+          </p:nvPr>
+        </p:nvPicPr>
+        <p:blipFill>
+          <a:blip r:embed="rId1"/>
+          <a:stretch>
+            <a:fillRect/>
+          </a:stretch>
+        </p:blipFill>
+        <p:spPr>
+          <a:xfrm>
+            <a:off x="1048385" y="3260090"/>
+            <a:ext cx="10545445" cy="1828165"/>
+          </a:xfrm>
+          <a:prstGeom prst="rect">
+            <a:avLst/>
+          </a:prstGeom>
+        </p:spPr>
+      </p:pic>
+      <p:pic>
+        <p:nvPicPr>
+          <p:cNvPr id="9" name="Content Placeholder 8"/>
+          <p:cNvPicPr>
+            <a:picLocks noChangeAspect="1"/>
+          </p:cNvPicPr>
+          <p:nvPr>
+            <p:ph sz="half" idx="2"/>
+          </p:nvPr>
+        </p:nvPicPr>
+        <p:blipFill>
+          <a:blip r:embed="rId2"/>
+          <a:stretch>
+            <a:fillRect/>
+          </a:stretch>
+        </p:blipFill>
+        <p:spPr>
+          <a:xfrm>
+            <a:off x="1561465" y="2030730"/>
+            <a:ext cx="10032365" cy="649605"/>
+          </a:xfrm>
+          <a:prstGeom prst="rect">
+            <a:avLst/>
+          </a:prstGeom>
+        </p:spPr>
+      </p:pic>
+      <p:sp>
+        <p:nvSpPr>
+          <p:cNvPr id="21" name="Text Box 20"/>
+          <p:cNvSpPr txBox="1"/>
+          <p:nvPr/>
+        </p:nvSpPr>
+        <p:spPr>
+          <a:xfrm>
+            <a:off x="1048385" y="5292725"/>
+            <a:ext cx="9445625" cy="922020"/>
+          </a:xfrm>
+          <a:prstGeom prst="rect">
+            <a:avLst/>
+          </a:prstGeom>
+          <a:noFill/>
+          <a:ln w="12700" cmpd="sng">
+            <a:solidFill>
+              <a:schemeClr val="accent1">
+                <a:shade val="50000"/>
+              </a:schemeClr>
+            </a:solidFill>
+            <a:prstDash val="solid"/>
+          </a:ln>
+        </p:spPr>
+        <p:txBody>
+          <a:bodyPr wrap="square" rtlCol="0" anchor="t">
+            <a:spAutoFit/>
+          </a:bodyPr>
+          <a:p>
+            <a:r>
+              <a:rPr lang="en-US"/>
+              <a:t>Observation: </a:t>
+            </a:r>
+            <a:endParaRPr lang="en-US"/>
+          </a:p>
+          <a:p>
+            <a:r>
+              <a:rPr lang="en-US"/>
+              <a:t>TimeSeries Models do predict both direction and scale with reasonably high accuracy. </a:t>
+            </a:r>
+            <a:endParaRPr lang="en-US"/>
+          </a:p>
+          <a:p>
+            <a:r>
+              <a:rPr lang="en-US"/>
+              <a:t>When predicting long look ahead periods, TimeSeries models lose the ground on direction &amp; scale. </a:t>
+            </a:r>
+            <a:endParaRPr lang="en-US"/>
+          </a:p>
+        </p:txBody>
+      </p:sp>
+      <p:sp>
+        <p:nvSpPr>
+          <p:cNvPr id="10" name="Text Box 9"/>
+          <p:cNvSpPr txBox="1"/>
+          <p:nvPr/>
+        </p:nvSpPr>
+        <p:spPr>
+          <a:xfrm>
+            <a:off x="80010" y="3377565"/>
+            <a:ext cx="968375" cy="1476375"/>
+          </a:xfrm>
+          <a:prstGeom prst="rect">
+            <a:avLst/>
+          </a:prstGeom>
+          <a:noFill/>
+        </p:spPr>
+        <p:txBody>
+          <a:bodyPr wrap="square" rtlCol="0" anchor="t">
+            <a:spAutoFit/>
+          </a:bodyPr>
+          <a:p>
+            <a:r>
+              <a:rPr lang="en-US"/>
+              <a:t>p.day+1</a:t>
+            </a:r>
+            <a:endParaRPr lang="en-US"/>
+          </a:p>
+          <a:p>
+            <a:r>
+              <a:rPr lang="en-US"/>
+              <a:t>p.day+1</a:t>
+            </a:r>
+            <a:endParaRPr lang="en-US"/>
+          </a:p>
+          <a:p>
+            <a:r>
+              <a:rPr lang="en-US">
+                <a:sym typeface="+mn-ea"/>
+              </a:rPr>
+              <a:t>p.day+1</a:t>
+            </a:r>
+            <a:endParaRPr lang="en-US"/>
+          </a:p>
+          <a:p>
+            <a:r>
+              <a:rPr lang="en-US">
+                <a:sym typeface="+mn-ea"/>
+              </a:rPr>
+              <a:t>p.day+1</a:t>
+            </a:r>
+            <a:endParaRPr lang="en-US">
+              <a:sym typeface="+mn-ea"/>
+            </a:endParaRPr>
+          </a:p>
+          <a:p>
+            <a:r>
+              <a:rPr lang="en-US">
+                <a:sym typeface="+mn-ea"/>
+              </a:rPr>
+              <a:t>p.day+1</a:t>
+            </a:r>
+            <a:endParaRPr lang="en-US"/>
+          </a:p>
+        </p:txBody>
+      </p:sp>
+      <p:sp>
+        <p:nvSpPr>
+          <p:cNvPr id="11" name="Text Box 10"/>
+          <p:cNvSpPr txBox="1"/>
+          <p:nvPr/>
+        </p:nvSpPr>
+        <p:spPr>
+          <a:xfrm>
+            <a:off x="1652270" y="1662430"/>
+            <a:ext cx="10033000" cy="368300"/>
+          </a:xfrm>
+          <a:prstGeom prst="rect">
+            <a:avLst/>
+          </a:prstGeom>
+          <a:noFill/>
+        </p:spPr>
+        <p:txBody>
+          <a:bodyPr wrap="square" rtlCol="0" anchor="t">
+            <a:spAutoFit/>
+          </a:bodyPr>
+          <a:p>
+            <a:r>
+              <a:rPr lang="en-US"/>
+              <a:t>	t.day+1  		t.day+1		t</a:t>
+            </a:r>
+            <a:r>
+              <a:rPr lang="en-US">
+                <a:sym typeface="+mn-ea"/>
+              </a:rPr>
+              <a:t>.day+1		t.day+1		t.day+1</a:t>
+            </a:r>
+            <a:endParaRPr lang="en-US"/>
+          </a:p>
+        </p:txBody>
+      </p:sp>
+      <p:sp>
+        <p:nvSpPr>
+          <p:cNvPr id="12" name="Text Box 11"/>
+          <p:cNvSpPr txBox="1"/>
+          <p:nvPr/>
+        </p:nvSpPr>
+        <p:spPr>
+          <a:xfrm>
+            <a:off x="1561465" y="1662430"/>
+            <a:ext cx="968375" cy="368300"/>
+          </a:xfrm>
+          <a:prstGeom prst="rect">
+            <a:avLst/>
+          </a:prstGeom>
+          <a:noFill/>
+        </p:spPr>
+        <p:txBody>
+          <a:bodyPr wrap="square" rtlCol="0" anchor="t">
+            <a:spAutoFit/>
+          </a:bodyPr>
+          <a:p>
+            <a:r>
+              <a:rPr lang="en-US"/>
+              <a:t>y_test</a:t>
+            </a:r>
+            <a:endParaRPr lang="en-US"/>
+          </a:p>
+        </p:txBody>
+      </p:sp>
+      <p:sp>
+        <p:nvSpPr>
+          <p:cNvPr id="13" name="Text Box 12"/>
+          <p:cNvSpPr txBox="1"/>
+          <p:nvPr/>
+        </p:nvSpPr>
+        <p:spPr>
+          <a:xfrm>
+            <a:off x="1179830" y="2921000"/>
+            <a:ext cx="968375" cy="368300"/>
+          </a:xfrm>
+          <a:prstGeom prst="rect">
+            <a:avLst/>
+          </a:prstGeom>
+          <a:noFill/>
+        </p:spPr>
+        <p:txBody>
+          <a:bodyPr wrap="square" rtlCol="0" anchor="t">
+            <a:spAutoFit/>
+          </a:bodyPr>
+          <a:p>
+            <a:r>
+              <a:rPr lang="en-US"/>
+              <a:t>y_pred</a:t>
+            </a:r>
+            <a:endParaRPr lang="en-US"/>
+          </a:p>
+        </p:txBody>
+      </p:sp>
+      <p:sp>
+        <p:nvSpPr>
+          <p:cNvPr id="14" name="Text Box 13"/>
+          <p:cNvSpPr txBox="1"/>
+          <p:nvPr/>
+        </p:nvSpPr>
+        <p:spPr>
+          <a:xfrm>
+            <a:off x="2275205" y="2872740"/>
+            <a:ext cx="9445625" cy="368300"/>
+          </a:xfrm>
+          <a:prstGeom prst="rect">
+            <a:avLst/>
+          </a:prstGeom>
+          <a:noFill/>
+        </p:spPr>
+        <p:txBody>
+          <a:bodyPr wrap="square" rtlCol="0" anchor="t">
+            <a:spAutoFit/>
+          </a:bodyPr>
+          <a:p>
+            <a:r>
+              <a:rPr lang="en-US"/>
+              <a:t>f.day+1		f</a:t>
+            </a:r>
+            <a:r>
+              <a:rPr lang="en-US">
+                <a:sym typeface="+mn-ea"/>
+              </a:rPr>
+              <a:t>.day</a:t>
+            </a:r>
+            <a:r>
+              <a:rPr lang="en-US"/>
+              <a:t>+2		</a:t>
+            </a:r>
+            <a:r>
+              <a:rPr lang="en-US">
+                <a:sym typeface="+mn-ea"/>
+              </a:rPr>
+              <a:t>f</a:t>
+            </a:r>
+            <a:r>
+              <a:rPr lang="en-US">
+                <a:sym typeface="+mn-ea"/>
+              </a:rPr>
+              <a:t>.day</a:t>
+            </a:r>
+            <a:r>
+              <a:rPr lang="en-US"/>
+              <a:t>+3		</a:t>
+            </a:r>
+            <a:r>
+              <a:rPr lang="en-US">
+                <a:sym typeface="+mn-ea"/>
+              </a:rPr>
+              <a:t>f</a:t>
+            </a:r>
+            <a:r>
+              <a:rPr lang="en-US">
+                <a:sym typeface="+mn-ea"/>
+              </a:rPr>
+              <a:t>.day</a:t>
+            </a:r>
+            <a:r>
+              <a:rPr lang="en-US"/>
+              <a:t>+4		</a:t>
+            </a:r>
+            <a:r>
+              <a:rPr lang="en-US">
+                <a:sym typeface="+mn-ea"/>
+              </a:rPr>
+              <a:t>f</a:t>
+            </a:r>
+            <a:r>
+              <a:rPr lang="en-US">
+                <a:sym typeface="+mn-ea"/>
+              </a:rPr>
+              <a:t>.day</a:t>
+            </a:r>
+            <a:r>
+              <a:rPr lang="en-US"/>
+              <a:t>+5</a:t>
+            </a:r>
+            <a:endParaRPr lang="en-US"/>
+          </a:p>
+        </p:txBody>
+      </p:sp>
+    </p:spTree>
+  </p:cSld>
+  <p:clrMapOvr>
+    <a:masterClrMapping/>
+  </p:clrMapOvr>
+</p:sld>
+</file>
+
+<file path=ppt/slides/slide6.xml><?xml version="1.0" encoding="utf-8"?>
 <p:sld xmlns:a="http://schemas.openxmlformats.org/drawingml/2006/main" xmlns:r="http://schemas.openxmlformats.org/officeDocument/2006/relationships" xmlns:p="http://schemas.openxmlformats.org/presentationml/2006/main">
   <p:cSld>
     <p:spTree>
@@ -4628,7 +4969,7 @@
 </p:sld>
 </file>
 
-<file path=ppt/slides/slide6.xml><?xml version="1.0" encoding="utf-8"?>
+<file path=ppt/slides/slide7.xml><?xml version="1.0" encoding="utf-8"?>
 <p:sld xmlns:a="http://schemas.openxmlformats.org/drawingml/2006/main" xmlns:r="http://schemas.openxmlformats.org/officeDocument/2006/relationships" xmlns:p="http://schemas.openxmlformats.org/presentationml/2006/main">
   <p:cSld>
     <p:spTree>
@@ -4896,262 +5237,6 @@
             <a:r>
               <a:rPr lang="en-US"/>
               <a:t>3rd round : nnodes=100; batch_size=50, epocs=200</a:t>
-            </a:r>
-            <a:endParaRPr lang="en-US"/>
-          </a:p>
-        </p:txBody>
-      </p:sp>
-    </p:spTree>
-  </p:cSld>
-  <p:clrMapOvr>
-    <a:masterClrMapping/>
-  </p:clrMapOvr>
-</p:sld>
-</file>
-
-<file path=ppt/slides/slide7.xml><?xml version="1.0" encoding="utf-8"?>
-<p:sld xmlns:a="http://schemas.openxmlformats.org/drawingml/2006/main" xmlns:r="http://schemas.openxmlformats.org/officeDocument/2006/relationships" xmlns:p="http://schemas.openxmlformats.org/presentationml/2006/main">
-  <p:cSld>
-    <p:spTree>
-      <p:nvGrpSpPr>
-        <p:cNvPr id="1" name=""/>
-        <p:cNvGrpSpPr/>
-        <p:nvPr/>
-      </p:nvGrpSpPr>
-      <p:grpSpPr/>
-      <p:sp>
-        <p:nvSpPr>
-          <p:cNvPr id="9" name="Title 8"/>
-          <p:cNvSpPr>
-            <a:spLocks noGrp="1"/>
-          </p:cNvSpPr>
-          <p:nvPr>
-            <p:ph type="title"/>
-          </p:nvPr>
-        </p:nvSpPr>
-        <p:spPr/>
-        <p:txBody>
-          <a:bodyPr>
-            <a:normAutofit fontScale="90000"/>
-          </a:bodyPr>
-          <a:p>
-            <a:r>
-              <a:rPr lang="en-US"/>
-              <a:t>MultiVariate RNN Prediction - Volume, IV &amp; RV -</a:t>
-            </a:r>
-            <a:br>
-              <a:rPr lang="en-US"/>
-            </a:br>
-            <a:r>
-              <a:rPr lang="en-US" sz="2700"/>
-              <a:t> </a:t>
-            </a:r>
-            <a:r>
-              <a:rPr lang="en-US" sz="2200"/>
-              <a:t>3 layer LSTM, Activator = adam, loss=MSE, dropout 20%, 70% train test split, 20% Validation Split</a:t>
-            </a:r>
-            <a:endParaRPr lang="en-US" sz="2200"/>
-          </a:p>
-        </p:txBody>
-      </p:sp>
-      <p:pic>
-        <p:nvPicPr>
-          <p:cNvPr id="10" name="Content Placeholder 9" descr="mv_lstm_100U-50e-5day"/>
-          <p:cNvPicPr>
-            <a:picLocks noChangeAspect="1"/>
-          </p:cNvPicPr>
-          <p:nvPr>
-            <p:ph idx="1"/>
-          </p:nvPr>
-        </p:nvPicPr>
-        <p:blipFill>
-          <a:blip r:embed="rId1"/>
-          <a:stretch>
-            <a:fillRect/>
-          </a:stretch>
-        </p:blipFill>
-        <p:spPr>
-          <a:xfrm>
-            <a:off x="373380" y="1746885"/>
-            <a:ext cx="5520690" cy="2663190"/>
-          </a:xfrm>
-          <a:prstGeom prst="rect">
-            <a:avLst/>
-          </a:prstGeom>
-        </p:spPr>
-      </p:pic>
-      <p:pic>
-        <p:nvPicPr>
-          <p:cNvPr id="11" name="Picture 10" descr="image (5)"/>
-          <p:cNvPicPr>
-            <a:picLocks noChangeAspect="1"/>
-          </p:cNvPicPr>
-          <p:nvPr/>
-        </p:nvPicPr>
-        <p:blipFill>
-          <a:blip r:embed="rId2"/>
-          <a:stretch>
-            <a:fillRect/>
-          </a:stretch>
-        </p:blipFill>
-        <p:spPr>
-          <a:xfrm>
-            <a:off x="417195" y="4366895"/>
-            <a:ext cx="5238115" cy="2491105"/>
-          </a:xfrm>
-          <a:prstGeom prst="rect">
-            <a:avLst/>
-          </a:prstGeom>
-        </p:spPr>
-      </p:pic>
-      <p:pic>
-        <p:nvPicPr>
-          <p:cNvPr id="12" name="Picture 11" descr="image (6)"/>
-          <p:cNvPicPr>
-            <a:picLocks noChangeAspect="1"/>
-          </p:cNvPicPr>
-          <p:nvPr/>
-        </p:nvPicPr>
-        <p:blipFill>
-          <a:blip r:embed="rId3"/>
-          <a:stretch>
-            <a:fillRect/>
-          </a:stretch>
-        </p:blipFill>
-        <p:spPr>
-          <a:xfrm>
-            <a:off x="6132195" y="4110355"/>
-            <a:ext cx="5774055" cy="2747645"/>
-          </a:xfrm>
-          <a:prstGeom prst="rect">
-            <a:avLst/>
-          </a:prstGeom>
-        </p:spPr>
-      </p:pic>
-      <p:sp>
-        <p:nvSpPr>
-          <p:cNvPr id="23" name="Text Box 22"/>
-          <p:cNvSpPr txBox="1"/>
-          <p:nvPr/>
-        </p:nvSpPr>
-        <p:spPr>
-          <a:xfrm>
-            <a:off x="549275" y="1490345"/>
-            <a:ext cx="5582920" cy="368300"/>
-          </a:xfrm>
-          <a:prstGeom prst="rect">
-            <a:avLst/>
-          </a:prstGeom>
-          <a:noFill/>
-        </p:spPr>
-        <p:txBody>
-          <a:bodyPr wrap="none" rtlCol="0" anchor="t">
-            <a:spAutoFit/>
-          </a:bodyPr>
-          <a:p>
-            <a:r>
-              <a:rPr lang="en-US"/>
-              <a:t>Initial prediction Results - without hyper parameter tuning</a:t>
-            </a:r>
-            <a:endParaRPr lang="en-US"/>
-          </a:p>
-        </p:txBody>
-      </p:sp>
-      <p:sp>
-        <p:nvSpPr>
-          <p:cNvPr id="13" name="Text Box 12"/>
-          <p:cNvSpPr txBox="1"/>
-          <p:nvPr/>
-        </p:nvSpPr>
-        <p:spPr>
-          <a:xfrm>
-            <a:off x="6227445" y="3742055"/>
-            <a:ext cx="5817235" cy="368300"/>
-          </a:xfrm>
-          <a:prstGeom prst="rect">
-            <a:avLst/>
-          </a:prstGeom>
-          <a:noFill/>
-        </p:spPr>
-        <p:txBody>
-          <a:bodyPr wrap="none" rtlCol="0" anchor="t">
-            <a:spAutoFit/>
-          </a:bodyPr>
-          <a:p>
-            <a:r>
-              <a:rPr lang="en-US"/>
-              <a:t>Final prediction with nnodes=100, batch_size=20, epocs=100</a:t>
-            </a:r>
-            <a:endParaRPr lang="en-US"/>
-          </a:p>
-        </p:txBody>
-      </p:sp>
-      <p:sp>
-        <p:nvSpPr>
-          <p:cNvPr id="14" name="Text Box 13"/>
-          <p:cNvSpPr txBox="1"/>
-          <p:nvPr/>
-        </p:nvSpPr>
-        <p:spPr>
-          <a:xfrm>
-            <a:off x="6254115" y="1665605"/>
-            <a:ext cx="5763895" cy="2030095"/>
-          </a:xfrm>
-          <a:prstGeom prst="rect">
-            <a:avLst/>
-          </a:prstGeom>
-          <a:noFill/>
-        </p:spPr>
-        <p:txBody>
-          <a:bodyPr wrap="none" rtlCol="0" anchor="t">
-            <a:spAutoFit/>
-          </a:bodyPr>
-          <a:p>
-            <a:r>
-              <a:rPr lang="en-US"/>
-              <a:t>Challenges - </a:t>
-            </a:r>
-            <a:endParaRPr lang="en-US"/>
-          </a:p>
-          <a:p>
-            <a:r>
-              <a:rPr lang="en-US"/>
-              <a:t>1. MinMaxScaler/Std Scalers dont accept more </a:t>
-            </a:r>
-            <a:endParaRPr lang="en-US"/>
-          </a:p>
-          <a:p>
-            <a:r>
-              <a:rPr lang="en-US"/>
-              <a:t>than 2dimensional Vectors. </a:t>
-            </a:r>
-            <a:endParaRPr lang="en-US"/>
-          </a:p>
-          <a:p>
-            <a:r>
-              <a:rPr lang="en-US"/>
-              <a:t>2. Our data set has n smaples ,2 features and 5 day window, </a:t>
-            </a:r>
-            <a:endParaRPr lang="en-US"/>
-          </a:p>
-          <a:p>
-            <a:r>
-              <a:rPr lang="en-US"/>
-              <a:t>making it 3D Vector</a:t>
-            </a:r>
-            <a:endParaRPr lang="en-US"/>
-          </a:p>
-          <a:p>
-            <a:r>
-              <a:rPr lang="en-US"/>
-              <a:t>3. Had to create scaler Matrix with minMax scaler for </a:t>
-            </a:r>
-            <a:endParaRPr lang="en-US"/>
-          </a:p>
-          <a:p>
-            <a:r>
-              <a:rPr lang="en-US"/>
-              <a:t>each of the extra dimensiion</a:t>
             </a:r>
             <a:endParaRPr lang="en-US"/>
           </a:p>
@@ -5177,7 +5262,7 @@
       <p:grpSpPr/>
       <p:sp>
         <p:nvSpPr>
-          <p:cNvPr id="7" name="Title 6"/>
+          <p:cNvPr id="9" name="Title 8"/>
           <p:cNvSpPr>
             <a:spLocks noGrp="1"/>
           </p:cNvSpPr>
@@ -5193,27 +5278,31 @@
           <a:p>
             <a:r>
               <a:rPr lang="en-US"/>
-              <a:t>Feature Engineering - Using Technical Indicators</a:t>
+              <a:t>MultiVariate RNN Prediction - Volume, IV &amp; RV -</a:t>
             </a:r>
             <a:br>
               <a:rPr lang="en-US"/>
             </a:br>
             <a:r>
-              <a:rPr lang="en-US"/>
-              <a:t>&amp; XGBoost Decision Tree Model to identify Feature Importance</a:t>
-            </a:r>
-            <a:endParaRPr lang="en-US"/>
+              <a:rPr lang="en-US" sz="2700"/>
+              <a:t> </a:t>
+            </a:r>
+            <a:r>
+              <a:rPr lang="en-US" sz="2200"/>
+              <a:t>3 layer LSTM, Activator = adam, loss=MSE, dropout 20%, 70% train test split, 20% Validation Split</a:t>
+            </a:r>
+            <a:endParaRPr lang="en-US" sz="2200"/>
           </a:p>
         </p:txBody>
       </p:sp>
       <p:pic>
         <p:nvPicPr>
-          <p:cNvPr id="4" name="Content Placeholder 3"/>
+          <p:cNvPr id="10" name="Content Placeholder 9" descr="mv_lstm_100U-50e-5day"/>
           <p:cNvPicPr>
             <a:picLocks noChangeAspect="1"/>
           </p:cNvPicPr>
           <p:nvPr>
-            <p:ph sz="half" idx="1"/>
+            <p:ph idx="1"/>
           </p:nvPr>
         </p:nvPicPr>
         <p:blipFill>
@@ -5224,8 +5313,8 @@
         </p:blipFill>
         <p:spPr>
           <a:xfrm>
-            <a:off x="123190" y="1819275"/>
-            <a:ext cx="4906010" cy="2303780"/>
+            <a:off x="373380" y="1746885"/>
+            <a:ext cx="5520690" cy="2663190"/>
           </a:xfrm>
           <a:prstGeom prst="rect">
             <a:avLst/>
@@ -5234,13 +5323,11 @@
       </p:pic>
       <p:pic>
         <p:nvPicPr>
-          <p:cNvPr id="6" name="Content Placeholder 5"/>
+          <p:cNvPr id="11" name="Picture 10" descr="image (5)"/>
           <p:cNvPicPr>
             <a:picLocks noChangeAspect="1"/>
           </p:cNvPicPr>
-          <p:nvPr>
-            <p:ph sz="half" idx="2"/>
-          </p:nvPr>
+          <p:nvPr/>
         </p:nvPicPr>
         <p:blipFill>
           <a:blip r:embed="rId2"/>
@@ -5250,8 +5337,8 @@
         </p:blipFill>
         <p:spPr>
           <a:xfrm>
-            <a:off x="123190" y="3532505"/>
-            <a:ext cx="4906010" cy="2369185"/>
+            <a:off x="417195" y="4366895"/>
+            <a:ext cx="5238115" cy="2491105"/>
           </a:xfrm>
           <a:prstGeom prst="rect">
             <a:avLst/>
@@ -5260,7 +5347,7 @@
       </p:pic>
       <p:pic>
         <p:nvPicPr>
-          <p:cNvPr id="8" name="Picture 7"/>
+          <p:cNvPr id="12" name="Picture 11" descr="image (6)"/>
           <p:cNvPicPr>
             <a:picLocks noChangeAspect="1"/>
           </p:cNvPicPr>
@@ -5274,8 +5361,8 @@
         </p:blipFill>
         <p:spPr>
           <a:xfrm>
-            <a:off x="8186420" y="1546225"/>
-            <a:ext cx="3695700" cy="4152900"/>
+            <a:off x="6132195" y="4110355"/>
+            <a:ext cx="5774055" cy="2747645"/>
           </a:xfrm>
           <a:prstGeom prst="rect">
             <a:avLst/>
@@ -5284,14 +5371,14 @@
       </p:pic>
       <p:sp>
         <p:nvSpPr>
-          <p:cNvPr id="9" name="Text Box 8"/>
+          <p:cNvPr id="23" name="Text Box 22"/>
           <p:cNvSpPr txBox="1"/>
           <p:nvPr/>
         </p:nvSpPr>
         <p:spPr>
           <a:xfrm>
-            <a:off x="2547620" y="6209030"/>
-            <a:ext cx="8303260" cy="368300"/>
+            <a:off x="549275" y="1490345"/>
+            <a:ext cx="5582920" cy="368300"/>
           </a:xfrm>
           <a:prstGeom prst="rect">
             <a:avLst/>
@@ -5299,42 +5386,118 @@
           <a:noFill/>
         </p:spPr>
         <p:txBody>
-          <a:bodyPr wrap="square" rtlCol="0" anchor="t">
+          <a:bodyPr wrap="none" rtlCol="0" anchor="t">
             <a:spAutoFit/>
           </a:bodyPr>
           <a:p>
             <a:r>
               <a:rPr lang="en-US"/>
-              <a:t>gamma=0.0,n_estimators=150,base_score=0.7,colsample_bytree=1,learning_rate=0.07</a:t>
-            </a:r>
-            <a:endParaRPr lang="en-US"/>
-          </a:p>
-        </p:txBody>
-      </p:sp>
-      <p:pic>
-        <p:nvPicPr>
-          <p:cNvPr id="10" name="Picture 9"/>
-          <p:cNvPicPr>
-            <a:picLocks noChangeAspect="1"/>
-          </p:cNvPicPr>
+              <a:t>Initial prediction Results - without hyper parameter tuning</a:t>
+            </a:r>
+            <a:endParaRPr lang="en-US"/>
+          </a:p>
+        </p:txBody>
+      </p:sp>
+      <p:sp>
+        <p:nvSpPr>
+          <p:cNvPr id="13" name="Text Box 12"/>
+          <p:cNvSpPr txBox="1"/>
           <p:nvPr/>
-        </p:nvPicPr>
-        <p:blipFill>
-          <a:blip r:embed="rId4"/>
-          <a:stretch>
-            <a:fillRect/>
-          </a:stretch>
-        </p:blipFill>
-        <p:spPr>
-          <a:xfrm>
-            <a:off x="5161280" y="2472055"/>
-            <a:ext cx="2895600" cy="2095500"/>
-          </a:xfrm>
-          <a:prstGeom prst="rect">
-            <a:avLst/>
-          </a:prstGeom>
-        </p:spPr>
-      </p:pic>
+        </p:nvSpPr>
+        <p:spPr>
+          <a:xfrm>
+            <a:off x="6227445" y="3742055"/>
+            <a:ext cx="5817235" cy="368300"/>
+          </a:xfrm>
+          <a:prstGeom prst="rect">
+            <a:avLst/>
+          </a:prstGeom>
+          <a:noFill/>
+        </p:spPr>
+        <p:txBody>
+          <a:bodyPr wrap="none" rtlCol="0" anchor="t">
+            <a:spAutoFit/>
+          </a:bodyPr>
+          <a:p>
+            <a:r>
+              <a:rPr lang="en-US"/>
+              <a:t>Final prediction with nnodes=100, batch_size=20, epocs=100</a:t>
+            </a:r>
+            <a:endParaRPr lang="en-US"/>
+          </a:p>
+        </p:txBody>
+      </p:sp>
+      <p:sp>
+        <p:nvSpPr>
+          <p:cNvPr id="14" name="Text Box 13"/>
+          <p:cNvSpPr txBox="1"/>
+          <p:nvPr/>
+        </p:nvSpPr>
+        <p:spPr>
+          <a:xfrm>
+            <a:off x="6254115" y="1665605"/>
+            <a:ext cx="5763895" cy="2030095"/>
+          </a:xfrm>
+          <a:prstGeom prst="rect">
+            <a:avLst/>
+          </a:prstGeom>
+          <a:noFill/>
+        </p:spPr>
+        <p:txBody>
+          <a:bodyPr wrap="none" rtlCol="0" anchor="t">
+            <a:spAutoFit/>
+          </a:bodyPr>
+          <a:p>
+            <a:r>
+              <a:rPr lang="en-US"/>
+              <a:t>Challenges - </a:t>
+            </a:r>
+            <a:endParaRPr lang="en-US"/>
+          </a:p>
+          <a:p>
+            <a:r>
+              <a:rPr lang="en-US"/>
+              <a:t>1. MinMaxScaler/Std Scalers dont accept more </a:t>
+            </a:r>
+            <a:endParaRPr lang="en-US"/>
+          </a:p>
+          <a:p>
+            <a:r>
+              <a:rPr lang="en-US"/>
+              <a:t>than 2dimensional Vectors. </a:t>
+            </a:r>
+            <a:endParaRPr lang="en-US"/>
+          </a:p>
+          <a:p>
+            <a:r>
+              <a:rPr lang="en-US"/>
+              <a:t>2. Our data set has n smaples ,2 features and 5 day window, </a:t>
+            </a:r>
+            <a:endParaRPr lang="en-US"/>
+          </a:p>
+          <a:p>
+            <a:r>
+              <a:rPr lang="en-US"/>
+              <a:t>making it 3D Vector</a:t>
+            </a:r>
+            <a:endParaRPr lang="en-US"/>
+          </a:p>
+          <a:p>
+            <a:r>
+              <a:rPr lang="en-US"/>
+              <a:t>3. Had to create scaler Matrix with minMax scaler for </a:t>
+            </a:r>
+            <a:endParaRPr lang="en-US"/>
+          </a:p>
+          <a:p>
+            <a:r>
+              <a:rPr lang="en-US"/>
+              <a:t>each of the extra dimensiion</a:t>
+            </a:r>
+            <a:endParaRPr lang="en-US"/>
+          </a:p>
+        </p:txBody>
+      </p:sp>
     </p:spTree>
   </p:cSld>
   <p:clrMapOvr>
@@ -5355,7 +5518,7 @@
       <p:grpSpPr/>
       <p:sp>
         <p:nvSpPr>
-          <p:cNvPr id="9" name="Title 8"/>
+          <p:cNvPr id="7" name="Title 6"/>
           <p:cNvSpPr>
             <a:spLocks noGrp="1"/>
           </p:cNvSpPr>
@@ -5371,28 +5534,14 @@
           <a:p>
             <a:r>
               <a:rPr lang="en-US"/>
-              <a:t>Feature Engineered RNN - </a:t>
-            </a:r>
-            <a:r>
-              <a:rPr lang="en-US" sz="3100"/>
-              <a:t>10 features, </a:t>
-            </a:r>
-            <a:r>
-              <a:rPr lang="en-US" sz="2700">
-                <a:sym typeface="+mn-ea"/>
-              </a:rPr>
-              <a:t>5day Predictions</a:t>
+              <a:t>Feature Engineering - Using Technical Indicators</a:t>
             </a:r>
             <a:br>
-              <a:rPr lang="en-US" sz="2700">
-                <a:sym typeface="+mn-ea"/>
-              </a:rPr>
+              <a:rPr lang="en-US"/>
             </a:br>
             <a:r>
-              <a:rPr lang="en-US" sz="2700">
-                <a:sym typeface="+mn-ea"/>
-              </a:rPr>
-              <a:t>nnodes = 100, Batch_size=5, epochs=100, dropout=0, train test: 70% validate-10% </a:t>
+              <a:rPr lang="en-US"/>
+              <a:t>&amp; XGBoost Decision Tree Model to identify Feature Importance</a:t>
             </a:r>
             <a:endParaRPr lang="en-US"/>
           </a:p>
@@ -5400,7 +5549,7 @@
       </p:sp>
       <p:pic>
         <p:nvPicPr>
-          <p:cNvPr id="7" name="Content Placeholder 6" descr="image (7)"/>
+          <p:cNvPr id="4" name="Content Placeholder 3"/>
           <p:cNvPicPr>
             <a:picLocks noChangeAspect="1"/>
           </p:cNvPicPr>
@@ -5416,8 +5565,8 @@
         </p:blipFill>
         <p:spPr>
           <a:xfrm>
-            <a:off x="6381750" y="5293360"/>
-            <a:ext cx="5181600" cy="1379855"/>
+            <a:off x="123190" y="1819275"/>
+            <a:ext cx="4906010" cy="2303780"/>
           </a:xfrm>
           <a:prstGeom prst="rect">
             <a:avLst/>
@@ -5426,7 +5575,7 @@
       </p:pic>
       <p:pic>
         <p:nvPicPr>
-          <p:cNvPr id="8" name="Content Placeholder 7" descr="image (8)"/>
+          <p:cNvPr id="6" name="Content Placeholder 5"/>
           <p:cNvPicPr>
             <a:picLocks noChangeAspect="1"/>
           </p:cNvPicPr>
@@ -5442,8 +5591,8 @@
         </p:blipFill>
         <p:spPr>
           <a:xfrm>
-            <a:off x="6140450" y="3521710"/>
-            <a:ext cx="5422900" cy="1414780"/>
+            <a:off x="123190" y="3532505"/>
+            <a:ext cx="4906010" cy="2369185"/>
           </a:xfrm>
           <a:prstGeom prst="rect">
             <a:avLst/>
@@ -5452,7 +5601,7 @@
       </p:pic>
       <p:pic>
         <p:nvPicPr>
-          <p:cNvPr id="15" name="Picture 14" descr="xg_lstm_100u-50e-100b-10day"/>
+          <p:cNvPr id="8" name="Picture 7"/>
           <p:cNvPicPr>
             <a:picLocks noChangeAspect="1"/>
           </p:cNvPicPr>
@@ -5466,17 +5615,46 @@
         </p:blipFill>
         <p:spPr>
           <a:xfrm>
-            <a:off x="175260" y="3262630"/>
-            <a:ext cx="5965190" cy="1547495"/>
+            <a:off x="8186420" y="1546225"/>
+            <a:ext cx="3695700" cy="4152900"/>
           </a:xfrm>
           <a:prstGeom prst="rect">
             <a:avLst/>
           </a:prstGeom>
         </p:spPr>
       </p:pic>
+      <p:sp>
+        <p:nvSpPr>
+          <p:cNvPr id="9" name="Text Box 8"/>
+          <p:cNvSpPr txBox="1"/>
+          <p:nvPr/>
+        </p:nvSpPr>
+        <p:spPr>
+          <a:xfrm>
+            <a:off x="2547620" y="6209030"/>
+            <a:ext cx="8303260" cy="368300"/>
+          </a:xfrm>
+          <a:prstGeom prst="rect">
+            <a:avLst/>
+          </a:prstGeom>
+          <a:noFill/>
+        </p:spPr>
+        <p:txBody>
+          <a:bodyPr wrap="square" rtlCol="0" anchor="t">
+            <a:spAutoFit/>
+          </a:bodyPr>
+          <a:p>
+            <a:r>
+              <a:rPr lang="en-US"/>
+              <a:t>gamma=0.0,n_estimators=150,base_score=0.7,colsample_bytree=1,learning_rate=0.07</a:t>
+            </a:r>
+            <a:endParaRPr lang="en-US"/>
+          </a:p>
+        </p:txBody>
+      </p:sp>
       <p:pic>
         <p:nvPicPr>
-          <p:cNvPr id="17" name="Picture 16" descr="xg_lstm_100u-100e-100b-10day"/>
+          <p:cNvPr id="10" name="Picture 9"/>
           <p:cNvPicPr>
             <a:picLocks noChangeAspect="1"/>
           </p:cNvPicPr>
@@ -5490,56 +5668,8 @@
         </p:blipFill>
         <p:spPr>
           <a:xfrm>
-            <a:off x="175260" y="5090795"/>
-            <a:ext cx="5549900" cy="1469390"/>
-          </a:xfrm>
-          <a:prstGeom prst="rect">
-            <a:avLst/>
-          </a:prstGeom>
-        </p:spPr>
-      </p:pic>
-      <p:pic>
-        <p:nvPicPr>
-          <p:cNvPr id="18" name="Picture 17" descr="pca_lstm_100u-50e-100b-5day"/>
-          <p:cNvPicPr>
-            <a:picLocks noChangeAspect="1"/>
-          </p:cNvPicPr>
-          <p:nvPr/>
-        </p:nvPicPr>
-        <p:blipFill>
-          <a:blip r:embed="rId5"/>
-          <a:stretch>
-            <a:fillRect/>
-          </a:stretch>
-        </p:blipFill>
-        <p:spPr>
-          <a:xfrm>
-            <a:off x="6189345" y="1691005"/>
-            <a:ext cx="6002655" cy="1571625"/>
-          </a:xfrm>
-          <a:prstGeom prst="rect">
-            <a:avLst/>
-          </a:prstGeom>
-        </p:spPr>
-      </p:pic>
-      <p:pic>
-        <p:nvPicPr>
-          <p:cNvPr id="19" name="Picture 18" descr="xg_lstm_100u-200e-100b-5day"/>
-          <p:cNvPicPr>
-            <a:picLocks noChangeAspect="1"/>
-          </p:cNvPicPr>
-          <p:nvPr/>
-        </p:nvPicPr>
-        <p:blipFill>
-          <a:blip r:embed="rId6"/>
-          <a:stretch>
-            <a:fillRect/>
-          </a:stretch>
-        </p:blipFill>
-        <p:spPr>
-          <a:xfrm>
-            <a:off x="334645" y="1774825"/>
-            <a:ext cx="5854700" cy="1487805"/>
+            <a:off x="5161280" y="2472055"/>
+            <a:ext cx="2895600" cy="2095500"/>
           </a:xfrm>
           <a:prstGeom prst="rect">
             <a:avLst/>

</xml_diff>